<commit_message>
Updated more of the default templates and descriptions
</commit_message>
<xml_diff>
--- a/AllWorkshopTemplates/WorkshopHeader.pptx
+++ b/AllWorkshopTemplates/WorkshopHeader.pptx
@@ -104,6 +104,11 @@
       </a:defRPr>
     </a:lvl9pPr>
   </p:defaultTextStyle>
+  <p:extLst>
+    <p:ext uri="{EFAFB233-063F-42B5-8137-9DF3F51BA10A}">
+      <p15:sldGuideLst xmlns:p15="http://schemas.microsoft.com/office/powerpoint/2012/main"/>
+    </p:ext>
+  </p:extLst>
 </p:presentation>
 </file>
 
@@ -238,7 +243,7 @@
           <a:p>
             <a:fld id="{BED1614E-28FD-C54C-811F-CB4EE2076F62}" type="datetimeFigureOut">
               <a:rPr lang="en-US" smtClean="0"/>
-              <a:t>1/27/17</a:t>
+              <a:t>1/29/17</a:t>
             </a:fld>
             <a:endParaRPr lang="en-US"/>
           </a:p>
@@ -408,7 +413,7 @@
           <a:p>
             <a:fld id="{BED1614E-28FD-C54C-811F-CB4EE2076F62}" type="datetimeFigureOut">
               <a:rPr lang="en-US" smtClean="0"/>
-              <a:t>1/27/17</a:t>
+              <a:t>1/29/17</a:t>
             </a:fld>
             <a:endParaRPr lang="en-US"/>
           </a:p>
@@ -588,7 +593,7 @@
           <a:p>
             <a:fld id="{BED1614E-28FD-C54C-811F-CB4EE2076F62}" type="datetimeFigureOut">
               <a:rPr lang="en-US" smtClean="0"/>
-              <a:t>1/27/17</a:t>
+              <a:t>1/29/17</a:t>
             </a:fld>
             <a:endParaRPr lang="en-US"/>
           </a:p>
@@ -758,7 +763,7 @@
           <a:p>
             <a:fld id="{BED1614E-28FD-C54C-811F-CB4EE2076F62}" type="datetimeFigureOut">
               <a:rPr lang="en-US" smtClean="0"/>
-              <a:t>1/27/17</a:t>
+              <a:t>1/29/17</a:t>
             </a:fld>
             <a:endParaRPr lang="en-US"/>
           </a:p>
@@ -1004,7 +1009,7 @@
           <a:p>
             <a:fld id="{BED1614E-28FD-C54C-811F-CB4EE2076F62}" type="datetimeFigureOut">
               <a:rPr lang="en-US" smtClean="0"/>
-              <a:t>1/27/17</a:t>
+              <a:t>1/29/17</a:t>
             </a:fld>
             <a:endParaRPr lang="en-US"/>
           </a:p>
@@ -1236,7 +1241,7 @@
           <a:p>
             <a:fld id="{BED1614E-28FD-C54C-811F-CB4EE2076F62}" type="datetimeFigureOut">
               <a:rPr lang="en-US" smtClean="0"/>
-              <a:t>1/27/17</a:t>
+              <a:t>1/29/17</a:t>
             </a:fld>
             <a:endParaRPr lang="en-US"/>
           </a:p>
@@ -1603,7 +1608,7 @@
           <a:p>
             <a:fld id="{BED1614E-28FD-C54C-811F-CB4EE2076F62}" type="datetimeFigureOut">
               <a:rPr lang="en-US" smtClean="0"/>
-              <a:t>1/27/17</a:t>
+              <a:t>1/29/17</a:t>
             </a:fld>
             <a:endParaRPr lang="en-US"/>
           </a:p>
@@ -1721,7 +1726,7 @@
           <a:p>
             <a:fld id="{BED1614E-28FD-C54C-811F-CB4EE2076F62}" type="datetimeFigureOut">
               <a:rPr lang="en-US" smtClean="0"/>
-              <a:t>1/27/17</a:t>
+              <a:t>1/29/17</a:t>
             </a:fld>
             <a:endParaRPr lang="en-US"/>
           </a:p>
@@ -1816,7 +1821,7 @@
           <a:p>
             <a:fld id="{BED1614E-28FD-C54C-811F-CB4EE2076F62}" type="datetimeFigureOut">
               <a:rPr lang="en-US" smtClean="0"/>
-              <a:t>1/27/17</a:t>
+              <a:t>1/29/17</a:t>
             </a:fld>
             <a:endParaRPr lang="en-US"/>
           </a:p>
@@ -2093,7 +2098,7 @@
           <a:p>
             <a:fld id="{BED1614E-28FD-C54C-811F-CB4EE2076F62}" type="datetimeFigureOut">
               <a:rPr lang="en-US" smtClean="0"/>
-              <a:t>1/27/17</a:t>
+              <a:t>1/29/17</a:t>
             </a:fld>
             <a:endParaRPr lang="en-US"/>
           </a:p>
@@ -2346,7 +2351,7 @@
           <a:p>
             <a:fld id="{BED1614E-28FD-C54C-811F-CB4EE2076F62}" type="datetimeFigureOut">
               <a:rPr lang="en-US" smtClean="0"/>
-              <a:t>1/27/17</a:t>
+              <a:t>1/29/17</a:t>
             </a:fld>
             <a:endParaRPr lang="en-US"/>
           </a:p>
@@ -2559,7 +2564,7 @@
           <a:p>
             <a:fld id="{BED1614E-28FD-C54C-811F-CB4EE2076F62}" type="datetimeFigureOut">
               <a:rPr lang="en-US" smtClean="0"/>
-              <a:t>1/27/17</a:t>
+              <a:t>1/29/17</a:t>
             </a:fld>
             <a:endParaRPr lang="en-US"/>
           </a:p>
@@ -3194,8 +3199,8 @@
         </p:nvSpPr>
         <p:spPr>
           <a:xfrm>
-            <a:off x="5702740" y="3994726"/>
-            <a:ext cx="3001143" cy="646331"/>
+            <a:off x="6605231" y="3994726"/>
+            <a:ext cx="2098652" cy="369332"/>
           </a:xfrm>
           <a:prstGeom prst="rect">
             <a:avLst/>
@@ -3221,32 +3226,7 @@
                 <a:ea typeface="Tahoma" charset="0"/>
                 <a:cs typeface="Tahoma" charset="0"/>
               </a:rPr>
-              <a:t>DevOps: Cloud Native</a:t>
-            </a:r>
-          </a:p>
-          <a:p>
-            <a:pPr algn="r"/>
-            <a:r>
-              <a:rPr lang="en-US" b="1" dirty="0" err="1" smtClean="0">
-                <a:solidFill>
-                  <a:schemeClr val="bg1"/>
-                </a:solidFill>
-                <a:latin typeface="Tahoma" charset="0"/>
-                <a:ea typeface="Tahoma" charset="0"/>
-                <a:cs typeface="Tahoma" charset="0"/>
-              </a:rPr>
-              <a:t>Microservices</a:t>
-            </a:r>
-            <a:r>
-              <a:rPr lang="en-US" b="1" dirty="0" smtClean="0">
-                <a:solidFill>
-                  <a:schemeClr val="bg1"/>
-                </a:solidFill>
-                <a:latin typeface="Tahoma" charset="0"/>
-                <a:ea typeface="Tahoma" charset="0"/>
-                <a:cs typeface="Tahoma" charset="0"/>
-              </a:rPr>
-              <a:t> Workshop</a:t>
+              <a:t>Workshop Name</a:t>
             </a:r>
             <a:endParaRPr lang="en-US" b="1" dirty="0">
               <a:solidFill>

</xml_diff>